<commit_message>
Fixed git repo location to msdevmtl and added stephane as mtl speaker
</commit_message>
<xml_diff>
--- a/Locations/Montreal/Welcome.pptx
+++ b/Locations/Montreal/Welcome.pptx
@@ -5,14 +5,15 @@
     <p:sldMasterId id="2147483732" r:id="rId1"/>
   </p:sldMasterIdLst>
   <p:notesMasterIdLst>
-    <p:notesMasterId r:id="rId7"/>
+    <p:notesMasterId r:id="rId8"/>
   </p:notesMasterIdLst>
   <p:sldIdLst>
     <p:sldId id="642" r:id="rId2"/>
     <p:sldId id="556" r:id="rId3"/>
     <p:sldId id="604" r:id="rId4"/>
-    <p:sldId id="647" r:id="rId5"/>
-    <p:sldId id="648" r:id="rId6"/>
+    <p:sldId id="649" r:id="rId5"/>
+    <p:sldId id="650" r:id="rId6"/>
+    <p:sldId id="648" r:id="rId7"/>
   </p:sldIdLst>
   <p:sldSz cx="12192000" cy="6858000"/>
   <p:notesSz cx="7010400" cy="9296400"/>
@@ -119,7 +120,8 @@
             <p14:sldId id="642"/>
             <p14:sldId id="556"/>
             <p14:sldId id="604"/>
-            <p14:sldId id="647"/>
+            <p14:sldId id="649"/>
+            <p14:sldId id="650"/>
             <p14:sldId id="648"/>
           </p14:sldIdLst>
         </p14:section>
@@ -226,7 +228,7 @@
           <a:p>
             <a:fld id="{9EB326D8-4C38-4835-91AB-B79CDC0B07B3}" type="datetimeFigureOut">
               <a:rPr lang="en-US" smtClean="0"/>
-              <a:t>3/17/2019</a:t>
+              <a:t>3/28/2019</a:t>
             </a:fld>
             <a:endParaRPr lang="en-US"/>
           </a:p>
@@ -726,7 +728,7 @@
           <a:p>
             <a:fld id="{2C52CFDC-D2D5-4B9F-BA75-89F771E01AEB}" type="slidenum">
               <a:rPr lang="en-US" smtClean="0"/>
-              <a:t>5</a:t>
+              <a:t>6</a:t>
             </a:fld>
             <a:endParaRPr lang="en-US"/>
           </a:p>
@@ -5624,7 +5626,7 @@
           <a:p>
             <a:fld id="{021C408F-DF0D-4580-9F48-C473147CA8AF}" type="datetimeFigureOut">
               <a:rPr lang="en-US" smtClean="0"/>
-              <a:t>3/17/2019</a:t>
+              <a:t>3/28/2019</a:t>
             </a:fld>
             <a:endParaRPr lang="en-US"/>
           </a:p>
@@ -8414,54 +8416,6 @@
       </p:sp>
       <p:sp>
         <p:nvSpPr>
-          <p:cNvPr id="6" name="TextBox 5">
-            <a:extLst>
-              <a:ext uri="{FF2B5EF4-FFF2-40B4-BE49-F238E27FC236}">
-                <a16:creationId xmlns:a16="http://schemas.microsoft.com/office/drawing/2014/main" id="{5C2BCF1B-D436-4062-BDE8-8243B3F9F5BD}"/>
-              </a:ext>
-            </a:extLst>
-          </p:cNvPr>
-          <p:cNvSpPr txBox="1"/>
-          <p:nvPr/>
-        </p:nvSpPr>
-        <p:spPr>
-          <a:xfrm>
-            <a:off x="8681580" y="6475636"/>
-            <a:ext cx="5394754" cy="433965"/>
-          </a:xfrm>
-          <a:prstGeom prst="rect">
-            <a:avLst/>
-          </a:prstGeom>
-          <a:noFill/>
-        </p:spPr>
-        <p:txBody>
-          <a:bodyPr wrap="square" lIns="182880" tIns="146304" rIns="182880" bIns="146304" rtlCol="0">
-            <a:spAutoFit/>
-          </a:bodyPr>
-          <a:lstStyle/>
-          <a:p>
-            <a:r>
-              <a:rPr lang="en-US" sz="900" dirty="0">
-                <a:hlinkClick r:id="rId2" tooltip="http://www.slenquirer.com/2012/11/sle-promotes-healthy-eating-despite.html"/>
-              </a:rPr>
-              <a:t>This Photo</a:t>
-            </a:r>
-            <a:r>
-              <a:rPr lang="en-US" sz="900" dirty="0"/>
-              <a:t> by Unknown Author is licensed under </a:t>
-            </a:r>
-            <a:r>
-              <a:rPr lang="en-US" sz="900" dirty="0">
-                <a:hlinkClick r:id="rId3" tooltip="https://creativecommons.org/licenses/by-nc-sa/3.0/"/>
-              </a:rPr>
-              <a:t>CC BY-SA-NC</a:t>
-            </a:r>
-            <a:endParaRPr lang="en-US" sz="900" dirty="0"/>
-          </a:p>
-        </p:txBody>
-      </p:sp>
-      <p:sp>
-        <p:nvSpPr>
           <p:cNvPr id="12" name="TextBox 11">
             <a:extLst>
               <a:ext uri="{FF2B5EF4-FFF2-40B4-BE49-F238E27FC236}">
@@ -8582,6 +8536,524 @@
               </a:rPr>
               <a:t>Blog: domstamand.com</a:t>
             </a:r>
+          </a:p>
+        </p:txBody>
+      </p:sp>
+      <p:pic>
+        <p:nvPicPr>
+          <p:cNvPr id="14" name="Picture 13">
+            <a:extLst>
+              <a:ext uri="{FF2B5EF4-FFF2-40B4-BE49-F238E27FC236}">
+                <a16:creationId xmlns:a16="http://schemas.microsoft.com/office/drawing/2014/main" id="{BBDA2106-596F-47CD-A5B0-7B7626A220FC}"/>
+              </a:ext>
+            </a:extLst>
+          </p:cNvPr>
+          <p:cNvPicPr>
+            <a:picLocks noChangeAspect="1"/>
+          </p:cNvPicPr>
+          <p:nvPr/>
+        </p:nvPicPr>
+        <p:blipFill>
+          <a:blip r:embed="rId2">
+            <a:extLst>
+              <a:ext uri="{28A0092B-C50C-407E-A947-70E740481C1C}">
+                <a14:useLocalDpi xmlns:a14="http://schemas.microsoft.com/office/drawing/2010/main" val="0"/>
+              </a:ext>
+            </a:extLst>
+          </a:blip>
+          <a:stretch>
+            <a:fillRect/>
+          </a:stretch>
+        </p:blipFill>
+        <p:spPr>
+          <a:xfrm>
+            <a:off x="6899968" y="1517232"/>
+            <a:ext cx="2462976" cy="2462976"/>
+          </a:xfrm>
+          <a:prstGeom prst="rect">
+            <a:avLst/>
+          </a:prstGeom>
+        </p:spPr>
+      </p:pic>
+      <p:sp>
+        <p:nvSpPr>
+          <p:cNvPr id="15" name="TextBox 14">
+            <a:extLst>
+              <a:ext uri="{FF2B5EF4-FFF2-40B4-BE49-F238E27FC236}">
+                <a16:creationId xmlns:a16="http://schemas.microsoft.com/office/drawing/2014/main" id="{85D7B070-0B80-4B92-81B9-E115FB94A0F2}"/>
+              </a:ext>
+            </a:extLst>
+          </p:cNvPr>
+          <p:cNvSpPr txBox="1"/>
+          <p:nvPr/>
+        </p:nvSpPr>
+        <p:spPr>
+          <a:xfrm>
+            <a:off x="6627340" y="3980208"/>
+            <a:ext cx="3546389" cy="627864"/>
+          </a:xfrm>
+          <a:prstGeom prst="rect">
+            <a:avLst/>
+          </a:prstGeom>
+          <a:noFill/>
+        </p:spPr>
+        <p:txBody>
+          <a:bodyPr wrap="square" lIns="182880" tIns="146304" rIns="182880" bIns="146304" rtlCol="0">
+            <a:spAutoFit/>
+          </a:bodyPr>
+          <a:lstStyle/>
+          <a:p>
+            <a:pPr>
+              <a:lnSpc>
+                <a:spcPct val="90000"/>
+              </a:lnSpc>
+              <a:spcAft>
+                <a:spcPts val="600"/>
+              </a:spcAft>
+            </a:pPr>
+            <a:r>
+              <a:rPr lang="en-CA" sz="2400" b="1" dirty="0">
+                <a:solidFill>
+                  <a:schemeClr val="bg1"/>
+                </a:solidFill>
+              </a:rPr>
+              <a:t>Stephane Lapointe</a:t>
+            </a:r>
+            <a:endParaRPr lang="en-US" sz="2400" b="1" dirty="0" err="1">
+              <a:solidFill>
+                <a:schemeClr val="bg1"/>
+              </a:solidFill>
+            </a:endParaRPr>
+          </a:p>
+        </p:txBody>
+      </p:sp>
+      <p:sp>
+        <p:nvSpPr>
+          <p:cNvPr id="16" name="TextBox 15">
+            <a:extLst>
+              <a:ext uri="{FF2B5EF4-FFF2-40B4-BE49-F238E27FC236}">
+                <a16:creationId xmlns:a16="http://schemas.microsoft.com/office/drawing/2014/main" id="{ED9169BA-311E-4F62-B0D5-3CA1ABA7C549}"/>
+              </a:ext>
+            </a:extLst>
+          </p:cNvPr>
+          <p:cNvSpPr txBox="1"/>
+          <p:nvPr/>
+        </p:nvSpPr>
+        <p:spPr>
+          <a:xfrm>
+            <a:off x="6627339" y="4617493"/>
+            <a:ext cx="4160525" cy="1037207"/>
+          </a:xfrm>
+          <a:prstGeom prst="rect">
+            <a:avLst/>
+          </a:prstGeom>
+          <a:noFill/>
+        </p:spPr>
+        <p:txBody>
+          <a:bodyPr wrap="square" lIns="182880" tIns="146304" rIns="182880" bIns="146304" rtlCol="0">
+            <a:spAutoFit/>
+          </a:bodyPr>
+          <a:lstStyle/>
+          <a:p>
+            <a:pPr>
+              <a:lnSpc>
+                <a:spcPct val="90000"/>
+              </a:lnSpc>
+              <a:spcAft>
+                <a:spcPts val="600"/>
+              </a:spcAft>
+            </a:pPr>
+            <a:r>
+              <a:rPr lang="en-CA" sz="2400" dirty="0">
+                <a:solidFill>
+                  <a:schemeClr val="bg1"/>
+                </a:solidFill>
+              </a:rPr>
+              <a:t>Twitter: @</a:t>
+            </a:r>
+            <a:r>
+              <a:rPr lang="en-CA" sz="2400" dirty="0" err="1">
+                <a:solidFill>
+                  <a:schemeClr val="bg1"/>
+                </a:solidFill>
+              </a:rPr>
+              <a:t>s_lapointe</a:t>
+            </a:r>
+            <a:endParaRPr lang="en-CA" sz="2400" dirty="0">
+              <a:solidFill>
+                <a:schemeClr val="bg1"/>
+              </a:solidFill>
+            </a:endParaRPr>
+          </a:p>
+          <a:p>
+            <a:pPr>
+              <a:lnSpc>
+                <a:spcPct val="90000"/>
+              </a:lnSpc>
+              <a:spcAft>
+                <a:spcPts val="600"/>
+              </a:spcAft>
+            </a:pPr>
+            <a:r>
+              <a:rPr lang="en-CA" sz="2400" dirty="0">
+                <a:solidFill>
+                  <a:schemeClr val="bg1"/>
+                </a:solidFill>
+              </a:rPr>
+              <a:t>Blog: codeisahighway.com</a:t>
+            </a:r>
+          </a:p>
+        </p:txBody>
+      </p:sp>
+      <p:pic>
+        <p:nvPicPr>
+          <p:cNvPr id="3" name="Picture 2">
+            <a:extLst>
+              <a:ext uri="{FF2B5EF4-FFF2-40B4-BE49-F238E27FC236}">
+                <a16:creationId xmlns:a16="http://schemas.microsoft.com/office/drawing/2014/main" id="{9A9D526D-475D-4A2A-9775-7595EC422C8C}"/>
+              </a:ext>
+            </a:extLst>
+          </p:cNvPr>
+          <p:cNvPicPr>
+            <a:picLocks noChangeAspect="1"/>
+          </p:cNvPicPr>
+          <p:nvPr/>
+        </p:nvPicPr>
+        <p:blipFill>
+          <a:blip r:embed="rId3" cstate="print">
+            <a:extLst>
+              <a:ext uri="{28A0092B-C50C-407E-A947-70E740481C1C}">
+                <a14:useLocalDpi xmlns:a14="http://schemas.microsoft.com/office/drawing/2010/main" val="0"/>
+              </a:ext>
+            </a:extLst>
+          </a:blip>
+          <a:stretch>
+            <a:fillRect/>
+          </a:stretch>
+        </p:blipFill>
+        <p:spPr>
+          <a:xfrm>
+            <a:off x="745768" y="1558742"/>
+            <a:ext cx="3546389" cy="2362983"/>
+          </a:xfrm>
+          <a:prstGeom prst="rect">
+            <a:avLst/>
+          </a:prstGeom>
+        </p:spPr>
+      </p:pic>
+    </p:spTree>
+    <p:extLst>
+      <p:ext uri="{BB962C8B-B14F-4D97-AF65-F5344CB8AC3E}">
+        <p14:creationId xmlns:p14="http://schemas.microsoft.com/office/powerpoint/2010/main" val="1205232885"/>
+      </p:ext>
+    </p:extLst>
+  </p:cSld>
+  <p:clrMapOvr>
+    <a:masterClrMapping/>
+  </p:clrMapOvr>
+  <p:transition>
+    <p:fade/>
+  </p:transition>
+</p:sld>
+</file>
+
+<file path=ppt/slides/slide5.xml><?xml version="1.0" encoding="utf-8"?>
+<p:sld xmlns:a="http://schemas.openxmlformats.org/drawingml/2006/main" xmlns:r="http://schemas.openxmlformats.org/officeDocument/2006/relationships" xmlns:p="http://schemas.openxmlformats.org/presentationml/2006/main">
+  <p:cSld>
+    <p:spTree>
+      <p:nvGrpSpPr>
+        <p:cNvPr id="1" name=""/>
+        <p:cNvGrpSpPr/>
+        <p:nvPr/>
+      </p:nvGrpSpPr>
+      <p:grpSpPr>
+        <a:xfrm>
+          <a:off x="0" y="0"/>
+          <a:ext cx="0" cy="0"/>
+          <a:chOff x="0" y="0"/>
+          <a:chExt cx="0" cy="0"/>
+        </a:xfrm>
+      </p:grpSpPr>
+      <p:sp>
+        <p:nvSpPr>
+          <p:cNvPr id="4" name="Title 4"/>
+          <p:cNvSpPr txBox="1">
+            <a:spLocks/>
+          </p:cNvSpPr>
+          <p:nvPr/>
+        </p:nvSpPr>
+        <p:spPr>
+          <a:xfrm>
+            <a:off x="344245" y="382364"/>
+            <a:ext cx="11034712" cy="1876425"/>
+          </a:xfrm>
+          <a:prstGeom prst="rect">
+            <a:avLst/>
+          </a:prstGeom>
+        </p:spPr>
+        <p:txBody>
+          <a:bodyPr>
+            <a:normAutofit/>
+          </a:bodyPr>
+          <a:lstStyle>
+            <a:lvl1pPr algn="l" defTabSz="914180" rtl="0" eaLnBrk="1" latinLnBrk="0" hangingPunct="1">
+              <a:lnSpc>
+                <a:spcPct val="90000"/>
+              </a:lnSpc>
+              <a:spcBef>
+                <a:spcPct val="0"/>
+              </a:spcBef>
+              <a:buNone/>
+              <a:defRPr lang="en-US" sz="5293" b="0" kern="1200" cap="none" spc="-100" baseline="0" dirty="0" smtClean="0">
+                <a:ln w="3175">
+                  <a:noFill/>
+                </a:ln>
+                <a:solidFill>
+                  <a:schemeClr val="bg1"/>
+                </a:solidFill>
+                <a:effectLst/>
+                <a:latin typeface="+mj-lt"/>
+                <a:ea typeface="+mn-ea"/>
+                <a:cs typeface="Segoe UI" pitchFamily="34" charset="0"/>
+              </a:defRPr>
+            </a:lvl1pPr>
+          </a:lstStyle>
+          <a:p>
+            <a:r>
+              <a:rPr lang="en-CA" sz="6600" dirty="0">
+                <a:solidFill>
+                  <a:schemeClr val="bg2"/>
+                </a:solidFill>
+              </a:rPr>
+              <a:t>Speakers</a:t>
+            </a:r>
+          </a:p>
+        </p:txBody>
+      </p:sp>
+      <p:sp>
+        <p:nvSpPr>
+          <p:cNvPr id="6" name="TextBox 5">
+            <a:extLst>
+              <a:ext uri="{FF2B5EF4-FFF2-40B4-BE49-F238E27FC236}">
+                <a16:creationId xmlns:a16="http://schemas.microsoft.com/office/drawing/2014/main" id="{5C2BCF1B-D436-4062-BDE8-8243B3F9F5BD}"/>
+              </a:ext>
+            </a:extLst>
+          </p:cNvPr>
+          <p:cNvSpPr txBox="1"/>
+          <p:nvPr/>
+        </p:nvSpPr>
+        <p:spPr>
+          <a:xfrm>
+            <a:off x="8681580" y="6475636"/>
+            <a:ext cx="5394754" cy="433965"/>
+          </a:xfrm>
+          <a:prstGeom prst="rect">
+            <a:avLst/>
+          </a:prstGeom>
+          <a:noFill/>
+        </p:spPr>
+        <p:txBody>
+          <a:bodyPr wrap="square" lIns="182880" tIns="146304" rIns="182880" bIns="146304" rtlCol="0">
+            <a:spAutoFit/>
+          </a:bodyPr>
+          <a:lstStyle/>
+          <a:p>
+            <a:r>
+              <a:rPr lang="en-US" sz="900" dirty="0">
+                <a:hlinkClick r:id="rId2" tooltip="http://www.slenquirer.com/2012/11/sle-promotes-healthy-eating-despite.html"/>
+              </a:rPr>
+              <a:t>This Photo</a:t>
+            </a:r>
+            <a:r>
+              <a:rPr lang="en-US" sz="900" dirty="0"/>
+              <a:t> by Unknown Author is licensed under </a:t>
+            </a:r>
+            <a:r>
+              <a:rPr lang="en-US" sz="900" dirty="0">
+                <a:hlinkClick r:id="rId3" tooltip="https://creativecommons.org/licenses/by-nc-sa/3.0/"/>
+              </a:rPr>
+              <a:t>CC BY-SA-NC</a:t>
+            </a:r>
+            <a:endParaRPr lang="en-US" sz="900" dirty="0"/>
+          </a:p>
+        </p:txBody>
+      </p:sp>
+      <p:pic>
+        <p:nvPicPr>
+          <p:cNvPr id="11" name="Picture 10">
+            <a:extLst>
+              <a:ext uri="{FF2B5EF4-FFF2-40B4-BE49-F238E27FC236}">
+                <a16:creationId xmlns:a16="http://schemas.microsoft.com/office/drawing/2014/main" id="{1961063A-2840-49EA-90C3-C5B9428C2DD7}"/>
+              </a:ext>
+            </a:extLst>
+          </p:cNvPr>
+          <p:cNvPicPr>
+            <a:picLocks noChangeAspect="1"/>
+          </p:cNvPicPr>
+          <p:nvPr/>
+        </p:nvPicPr>
+        <p:blipFill>
+          <a:blip r:embed="rId4">
+            <a:extLst>
+              <a:ext uri="{28A0092B-C50C-407E-A947-70E740481C1C}">
+                <a14:useLocalDpi xmlns:a14="http://schemas.microsoft.com/office/drawing/2010/main" val="0"/>
+              </a:ext>
+              <a:ext uri="{837473B0-CC2E-450A-ABE3-18F120FF3D39}">
+                <a1611:picAttrSrcUrl xmlns:a1611="http://schemas.microsoft.com/office/drawing/2016/11/main" r:id="rId2"/>
+              </a:ext>
+            </a:extLst>
+          </a:blip>
+          <a:stretch>
+            <a:fillRect/>
+          </a:stretch>
+        </p:blipFill>
+        <p:spPr>
+          <a:xfrm>
+            <a:off x="1068222" y="1517232"/>
+            <a:ext cx="2601735" cy="2462976"/>
+          </a:xfrm>
+          <a:prstGeom prst="rect">
+            <a:avLst/>
+          </a:prstGeom>
+        </p:spPr>
+      </p:pic>
+      <p:sp>
+        <p:nvSpPr>
+          <p:cNvPr id="12" name="TextBox 11">
+            <a:extLst>
+              <a:ext uri="{FF2B5EF4-FFF2-40B4-BE49-F238E27FC236}">
+                <a16:creationId xmlns:a16="http://schemas.microsoft.com/office/drawing/2014/main" id="{85971E54-AD77-44C6-B148-6B5A1E057996}"/>
+              </a:ext>
+            </a:extLst>
+          </p:cNvPr>
+          <p:cNvSpPr txBox="1"/>
+          <p:nvPr/>
+        </p:nvSpPr>
+        <p:spPr>
+          <a:xfrm>
+            <a:off x="864973" y="3980208"/>
+            <a:ext cx="3546389" cy="627864"/>
+          </a:xfrm>
+          <a:prstGeom prst="rect">
+            <a:avLst/>
+          </a:prstGeom>
+          <a:noFill/>
+        </p:spPr>
+        <p:txBody>
+          <a:bodyPr wrap="square" lIns="182880" tIns="146304" rIns="182880" bIns="146304" rtlCol="0">
+            <a:spAutoFit/>
+          </a:bodyPr>
+          <a:lstStyle/>
+          <a:p>
+            <a:pPr>
+              <a:lnSpc>
+                <a:spcPct val="90000"/>
+              </a:lnSpc>
+              <a:spcAft>
+                <a:spcPts val="600"/>
+              </a:spcAft>
+            </a:pPr>
+            <a:r>
+              <a:rPr lang="en-CA" sz="2400" b="1" dirty="0">
+                <a:solidFill>
+                  <a:schemeClr val="bg1"/>
+                </a:solidFill>
+              </a:rPr>
+              <a:t>Jane Doe</a:t>
+            </a:r>
+            <a:endParaRPr lang="en-US" sz="2400" b="1" dirty="0" err="1">
+              <a:solidFill>
+                <a:schemeClr val="bg1"/>
+              </a:solidFill>
+            </a:endParaRPr>
+          </a:p>
+        </p:txBody>
+      </p:sp>
+      <p:sp>
+        <p:nvSpPr>
+          <p:cNvPr id="13" name="TextBox 12">
+            <a:extLst>
+              <a:ext uri="{FF2B5EF4-FFF2-40B4-BE49-F238E27FC236}">
+                <a16:creationId xmlns:a16="http://schemas.microsoft.com/office/drawing/2014/main" id="{89F31CCD-2949-408C-B72D-47E1F1F8FA71}"/>
+              </a:ext>
+            </a:extLst>
+          </p:cNvPr>
+          <p:cNvSpPr txBox="1"/>
+          <p:nvPr/>
+        </p:nvSpPr>
+        <p:spPr>
+          <a:xfrm>
+            <a:off x="864973" y="4617493"/>
+            <a:ext cx="3343140" cy="1446550"/>
+          </a:xfrm>
+          <a:prstGeom prst="rect">
+            <a:avLst/>
+          </a:prstGeom>
+          <a:noFill/>
+        </p:spPr>
+        <p:txBody>
+          <a:bodyPr wrap="square" lIns="182880" tIns="146304" rIns="182880" bIns="146304" rtlCol="0">
+            <a:spAutoFit/>
+          </a:bodyPr>
+          <a:lstStyle/>
+          <a:p>
+            <a:pPr>
+              <a:lnSpc>
+                <a:spcPct val="90000"/>
+              </a:lnSpc>
+              <a:spcAft>
+                <a:spcPts val="600"/>
+              </a:spcAft>
+            </a:pPr>
+            <a:r>
+              <a:rPr lang="en-CA" sz="2400" dirty="0">
+                <a:solidFill>
+                  <a:schemeClr val="bg1"/>
+                </a:solidFill>
+              </a:rPr>
+              <a:t>Twitter:</a:t>
+            </a:r>
+          </a:p>
+          <a:p>
+            <a:pPr>
+              <a:lnSpc>
+                <a:spcPct val="90000"/>
+              </a:lnSpc>
+              <a:spcAft>
+                <a:spcPts val="600"/>
+              </a:spcAft>
+            </a:pPr>
+            <a:r>
+              <a:rPr lang="en-CA" sz="2400" dirty="0">
+                <a:solidFill>
+                  <a:schemeClr val="bg1"/>
+                </a:solidFill>
+              </a:rPr>
+              <a:t>Blog: </a:t>
+            </a:r>
+          </a:p>
+          <a:p>
+            <a:pPr>
+              <a:lnSpc>
+                <a:spcPct val="90000"/>
+              </a:lnSpc>
+              <a:spcAft>
+                <a:spcPts val="600"/>
+              </a:spcAft>
+            </a:pPr>
+            <a:r>
+              <a:rPr lang="en-CA" sz="2400" dirty="0">
+                <a:solidFill>
+                  <a:schemeClr val="bg1"/>
+                </a:solidFill>
+              </a:rPr>
+              <a:t>Other:</a:t>
+            </a:r>
+            <a:endParaRPr lang="en-US" sz="2400" dirty="0" err="1">
+              <a:solidFill>
+                <a:schemeClr val="bg1"/>
+              </a:solidFill>
+            </a:endParaRPr>
           </a:p>
         </p:txBody>
       </p:sp>
@@ -8764,46 +9236,10 @@
           </a:p>
         </p:txBody>
       </p:sp>
-      <p:pic>
-        <p:nvPicPr>
-          <p:cNvPr id="3" name="Picture 2">
-            <a:extLst>
-              <a:ext uri="{FF2B5EF4-FFF2-40B4-BE49-F238E27FC236}">
-                <a16:creationId xmlns:a16="http://schemas.microsoft.com/office/drawing/2014/main" id="{9A9D526D-475D-4A2A-9775-7595EC422C8C}"/>
-              </a:ext>
-            </a:extLst>
-          </p:cNvPr>
-          <p:cNvPicPr>
-            <a:picLocks noChangeAspect="1"/>
-          </p:cNvPicPr>
-          <p:nvPr/>
-        </p:nvPicPr>
-        <p:blipFill>
-          <a:blip r:embed="rId5" cstate="print">
-            <a:extLst>
-              <a:ext uri="{28A0092B-C50C-407E-A947-70E740481C1C}">
-                <a14:useLocalDpi xmlns:a14="http://schemas.microsoft.com/office/drawing/2010/main" val="0"/>
-              </a:ext>
-            </a:extLst>
-          </a:blip>
-          <a:stretch>
-            <a:fillRect/>
-          </a:stretch>
-        </p:blipFill>
-        <p:spPr>
-          <a:xfrm>
-            <a:off x="745768" y="1558742"/>
-            <a:ext cx="3546389" cy="2362983"/>
-          </a:xfrm>
-          <a:prstGeom prst="rect">
-            <a:avLst/>
-          </a:prstGeom>
-        </p:spPr>
-      </p:pic>
     </p:spTree>
     <p:extLst>
       <p:ext uri="{BB962C8B-B14F-4D97-AF65-F5344CB8AC3E}">
-        <p14:creationId xmlns:p14="http://schemas.microsoft.com/office/powerpoint/2010/main" val="3766174091"/>
+        <p14:creationId xmlns:p14="http://schemas.microsoft.com/office/powerpoint/2010/main" val="1291928282"/>
       </p:ext>
     </p:extLst>
   </p:cSld>
@@ -8816,7 +9252,7 @@
 </p:sld>
 </file>
 
-<file path=ppt/slides/slide5.xml><?xml version="1.0" encoding="utf-8"?>
+<file path=ppt/slides/slide6.xml><?xml version="1.0" encoding="utf-8"?>
 <p:sld xmlns:a="http://schemas.openxmlformats.org/drawingml/2006/main" xmlns:r="http://schemas.openxmlformats.org/officeDocument/2006/relationships" xmlns:p="http://schemas.openxmlformats.org/presentationml/2006/main">
   <p:cSld>
     <p:spTree>

</xml_diff>

<commit_message>
Add Miguel's speaker slide
</commit_message>
<xml_diff>
--- a/Locations/Montreal/Welcome.pptx
+++ b/Locations/Montreal/Welcome.pptx
@@ -228,7 +228,7 @@
           <a:p>
             <a:fld id="{9EB326D8-4C38-4835-91AB-B79CDC0B07B3}" type="datetimeFigureOut">
               <a:rPr lang="en-US" smtClean="0"/>
-              <a:t>3/28/2019</a:t>
+              <a:t>3/29/2019</a:t>
             </a:fld>
             <a:endParaRPr lang="en-US"/>
           </a:p>
@@ -5626,7 +5626,7 @@
           <a:p>
             <a:fld id="{021C408F-DF0D-4580-9F48-C473147CA8AF}" type="datetimeFigureOut">
               <a:rPr lang="en-US" smtClean="0"/>
-              <a:t>3/28/2019</a:t>
+              <a:t>3/29/2019</a:t>
             </a:fld>
             <a:endParaRPr lang="en-US"/>
           </a:p>
@@ -8878,45 +8878,6 @@
           </a:p>
         </p:txBody>
       </p:sp>
-      <p:pic>
-        <p:nvPicPr>
-          <p:cNvPr id="11" name="Picture 10">
-            <a:extLst>
-              <a:ext uri="{FF2B5EF4-FFF2-40B4-BE49-F238E27FC236}">
-                <a16:creationId xmlns:a16="http://schemas.microsoft.com/office/drawing/2014/main" id="{1961063A-2840-49EA-90C3-C5B9428C2DD7}"/>
-              </a:ext>
-            </a:extLst>
-          </p:cNvPr>
-          <p:cNvPicPr>
-            <a:picLocks noChangeAspect="1"/>
-          </p:cNvPicPr>
-          <p:nvPr/>
-        </p:nvPicPr>
-        <p:blipFill>
-          <a:blip r:embed="rId4">
-            <a:extLst>
-              <a:ext uri="{28A0092B-C50C-407E-A947-70E740481C1C}">
-                <a14:useLocalDpi xmlns:a14="http://schemas.microsoft.com/office/drawing/2010/main" val="0"/>
-              </a:ext>
-              <a:ext uri="{837473B0-CC2E-450A-ABE3-18F120FF3D39}">
-                <a1611:picAttrSrcUrl xmlns:a1611="http://schemas.microsoft.com/office/drawing/2016/11/main" r:id="rId2"/>
-              </a:ext>
-            </a:extLst>
-          </a:blip>
-          <a:stretch>
-            <a:fillRect/>
-          </a:stretch>
-        </p:blipFill>
-        <p:spPr>
-          <a:xfrm>
-            <a:off x="1068222" y="1517232"/>
-            <a:ext cx="2601735" cy="2462976"/>
-          </a:xfrm>
-          <a:prstGeom prst="rect">
-            <a:avLst/>
-          </a:prstGeom>
-        </p:spPr>
-      </p:pic>
       <p:sp>
         <p:nvSpPr>
           <p:cNvPr id="12" name="TextBox 11">
@@ -8954,18 +8915,13 @@
               </a:spcAft>
             </a:pPr>
             <a:r>
-              <a:rPr lang="en-CA" sz="2400" b="1" dirty="0">
+              <a:rPr lang="en-US" sz="2400" b="1" dirty="0">
                 <a:solidFill>
                   <a:schemeClr val="bg1"/>
                 </a:solidFill>
               </a:rPr>
-              <a:t>Jane Doe</a:t>
-            </a:r>
-            <a:endParaRPr lang="en-US" sz="2400" b="1" dirty="0" err="1">
-              <a:solidFill>
-                <a:schemeClr val="bg1"/>
-              </a:solidFill>
-            </a:endParaRPr>
+              <a:t>Miguel Bernard</a:t>
+            </a:r>
           </a:p>
         </p:txBody>
       </p:sp>
@@ -8983,8 +8939,8 @@
         </p:nvSpPr>
         <p:spPr>
           <a:xfrm>
-            <a:off x="864973" y="4617493"/>
-            <a:ext cx="3343140" cy="1446550"/>
+            <a:off x="864972" y="4617493"/>
+            <a:ext cx="5762368" cy="1037207"/>
           </a:xfrm>
           <a:prstGeom prst="rect">
             <a:avLst/>
@@ -9011,8 +8967,19 @@
                   <a:schemeClr val="bg1"/>
                 </a:solidFill>
               </a:rPr>
-              <a:t>Twitter:</a:t>
-            </a:r>
+              <a:t>Twitter: </a:t>
+            </a:r>
+            <a:r>
+              <a:rPr lang="en-CA" dirty="0">
+                <a:hlinkClick r:id="rId4"/>
+              </a:rPr>
+              <a:t>@MiguelBernard88</a:t>
+            </a:r>
+            <a:endParaRPr lang="en-CA" sz="2400" dirty="0">
+              <a:solidFill>
+                <a:schemeClr val="bg1"/>
+              </a:solidFill>
+            </a:endParaRPr>
           </a:p>
           <a:p>
             <a:pPr>
@@ -9031,25 +8998,16 @@
               </a:rPr>
               <a:t>Blog: </a:t>
             </a:r>
-          </a:p>
-          <a:p>
-            <a:pPr>
-              <a:lnSpc>
-                <a:spcPct val="90000"/>
-              </a:lnSpc>
-              <a:spcAft>
-                <a:spcPts val="600"/>
-              </a:spcAft>
-            </a:pPr>
             <a:r>
               <a:rPr lang="en-CA" sz="2400" dirty="0">
                 <a:solidFill>
                   <a:schemeClr val="bg1"/>
                 </a:solidFill>
+                <a:hlinkClick r:id="rId5"/>
               </a:rPr>
-              <a:t>Other:</a:t>
-            </a:r>
-            <a:endParaRPr lang="en-US" sz="2400" dirty="0" err="1">
+              <a:t>https://blog.miguelbernard.com</a:t>
+            </a:r>
+            <a:endParaRPr lang="en-CA" sz="2400" dirty="0">
               <a:solidFill>
                 <a:schemeClr val="bg1"/>
               </a:solidFill>
@@ -9072,7 +9030,7 @@
           <p:nvPr/>
         </p:nvPicPr>
         <p:blipFill>
-          <a:blip r:embed="rId4">
+          <a:blip r:embed="rId6">
             <a:extLst>
               <a:ext uri="{28A0092B-C50C-407E-A947-70E740481C1C}">
                 <a14:useLocalDpi xmlns:a14="http://schemas.microsoft.com/office/drawing/2010/main" val="0"/>
@@ -9236,6 +9194,42 @@
           </a:p>
         </p:txBody>
       </p:sp>
+      <p:pic>
+        <p:nvPicPr>
+          <p:cNvPr id="3" name="Picture 2">
+            <a:extLst>
+              <a:ext uri="{FF2B5EF4-FFF2-40B4-BE49-F238E27FC236}">
+                <a16:creationId xmlns:a16="http://schemas.microsoft.com/office/drawing/2014/main" id="{15EC28C8-A898-4143-B0C5-A2E0746B37A2}"/>
+              </a:ext>
+            </a:extLst>
+          </p:cNvPr>
+          <p:cNvPicPr>
+            <a:picLocks noChangeAspect="1"/>
+          </p:cNvPicPr>
+          <p:nvPr/>
+        </p:nvPicPr>
+        <p:blipFill>
+          <a:blip r:embed="rId7">
+            <a:extLst>
+              <a:ext uri="{28A0092B-C50C-407E-A947-70E740481C1C}">
+                <a14:useLocalDpi xmlns:a14="http://schemas.microsoft.com/office/drawing/2010/main" val="0"/>
+              </a:ext>
+            </a:extLst>
+          </a:blip>
+          <a:stretch>
+            <a:fillRect/>
+          </a:stretch>
+        </p:blipFill>
+        <p:spPr>
+          <a:xfrm>
+            <a:off x="1110969" y="1517136"/>
+            <a:ext cx="2273199" cy="2463072"/>
+          </a:xfrm>
+          <a:prstGeom prst="rect">
+            <a:avLst/>
+          </a:prstGeom>
+        </p:spPr>
+      </p:pic>
     </p:spTree>
     <p:extLst>
       <p:ext uri="{BB962C8B-B14F-4D97-AF65-F5344CB8AC3E}">

</xml_diff>

<commit_message>
Add Alain Vezina as speaker
</commit_message>
<xml_diff>
--- a/Locations/Montreal/Welcome.pptx
+++ b/Locations/Montreal/Welcome.pptx
@@ -228,7 +228,7 @@
           <a:p>
             <a:fld id="{9EB326D8-4C38-4835-91AB-B79CDC0B07B3}" type="datetimeFigureOut">
               <a:rPr lang="en-US" smtClean="0"/>
-              <a:t>3/29/2019</a:t>
+              <a:t>4/1/2019</a:t>
             </a:fld>
             <a:endParaRPr lang="en-US"/>
           </a:p>
@@ -5626,7 +5626,7 @@
           <a:p>
             <a:fld id="{021C408F-DF0D-4580-9F48-C473147CA8AF}" type="datetimeFigureOut">
               <a:rPr lang="en-US" smtClean="0"/>
-              <a:t>3/29/2019</a:t>
+              <a:t>4/1/2019</a:t>
             </a:fld>
             <a:endParaRPr lang="en-US"/>
           </a:p>
@@ -8832,54 +8832,6 @@
       </p:sp>
       <p:sp>
         <p:nvSpPr>
-          <p:cNvPr id="6" name="TextBox 5">
-            <a:extLst>
-              <a:ext uri="{FF2B5EF4-FFF2-40B4-BE49-F238E27FC236}">
-                <a16:creationId xmlns:a16="http://schemas.microsoft.com/office/drawing/2014/main" id="{5C2BCF1B-D436-4062-BDE8-8243B3F9F5BD}"/>
-              </a:ext>
-            </a:extLst>
-          </p:cNvPr>
-          <p:cNvSpPr txBox="1"/>
-          <p:nvPr/>
-        </p:nvSpPr>
-        <p:spPr>
-          <a:xfrm>
-            <a:off x="8681580" y="6475636"/>
-            <a:ext cx="5394754" cy="433965"/>
-          </a:xfrm>
-          <a:prstGeom prst="rect">
-            <a:avLst/>
-          </a:prstGeom>
-          <a:noFill/>
-        </p:spPr>
-        <p:txBody>
-          <a:bodyPr wrap="square" lIns="182880" tIns="146304" rIns="182880" bIns="146304" rtlCol="0">
-            <a:spAutoFit/>
-          </a:bodyPr>
-          <a:lstStyle/>
-          <a:p>
-            <a:r>
-              <a:rPr lang="en-US" sz="900" dirty="0">
-                <a:hlinkClick r:id="rId2" tooltip="http://www.slenquirer.com/2012/11/sle-promotes-healthy-eating-despite.html"/>
-              </a:rPr>
-              <a:t>This Photo</a:t>
-            </a:r>
-            <a:r>
-              <a:rPr lang="en-US" sz="900" dirty="0"/>
-              <a:t> by Unknown Author is licensed under </a:t>
-            </a:r>
-            <a:r>
-              <a:rPr lang="en-US" sz="900" dirty="0">
-                <a:hlinkClick r:id="rId3" tooltip="https://creativecommons.org/licenses/by-nc-sa/3.0/"/>
-              </a:rPr>
-              <a:t>CC BY-SA-NC</a:t>
-            </a:r>
-            <a:endParaRPr lang="en-US" sz="900" dirty="0"/>
-          </a:p>
-        </p:txBody>
-      </p:sp>
-      <p:sp>
-        <p:nvSpPr>
           <p:cNvPr id="12" name="TextBox 11">
             <a:extLst>
               <a:ext uri="{FF2B5EF4-FFF2-40B4-BE49-F238E27FC236}">
@@ -8971,7 +8923,7 @@
             </a:r>
             <a:r>
               <a:rPr lang="en-CA" dirty="0">
-                <a:hlinkClick r:id="rId4"/>
+                <a:hlinkClick r:id="rId2"/>
               </a:rPr>
               <a:t>@MiguelBernard88</a:t>
             </a:r>
@@ -9003,7 +8955,7 @@
                 <a:solidFill>
                   <a:schemeClr val="bg1"/>
                 </a:solidFill>
-                <a:hlinkClick r:id="rId5"/>
+                <a:hlinkClick r:id="rId3"/>
               </a:rPr>
               <a:t>https://blog.miguelbernard.com</a:t>
             </a:r>
@@ -9030,13 +8982,10 @@
           <p:nvPr/>
         </p:nvPicPr>
         <p:blipFill>
-          <a:blip r:embed="rId6">
+          <a:blip r:embed="rId4" cstate="print">
             <a:extLst>
               <a:ext uri="{28A0092B-C50C-407E-A947-70E740481C1C}">
                 <a14:useLocalDpi xmlns:a14="http://schemas.microsoft.com/office/drawing/2010/main" val="0"/>
-              </a:ext>
-              <a:ext uri="{837473B0-CC2E-450A-ABE3-18F120FF3D39}">
-                <a1611:picAttrSrcUrl xmlns:a1611="http://schemas.microsoft.com/office/drawing/2016/11/main" r:id="rId2"/>
               </a:ext>
             </a:extLst>
           </a:blip>
@@ -9046,8 +8995,8 @@
         </p:blipFill>
         <p:spPr>
           <a:xfrm>
-            <a:off x="6830589" y="1517232"/>
-            <a:ext cx="2601735" cy="2462976"/>
+            <a:off x="6899968" y="1517232"/>
+            <a:ext cx="2462976" cy="2462976"/>
           </a:xfrm>
           <a:prstGeom prst="rect">
             <a:avLst/>
@@ -9096,7 +9045,7 @@
                   <a:schemeClr val="bg1"/>
                 </a:solidFill>
               </a:rPr>
-              <a:t>John Doe</a:t>
+              <a:t>Alain Vézina</a:t>
             </a:r>
             <a:endParaRPr lang="en-US" sz="2400" b="1" dirty="0" err="1">
               <a:solidFill>
@@ -9120,8 +9069,8 @@
         </p:nvSpPr>
         <p:spPr>
           <a:xfrm>
-            <a:off x="6627340" y="4617493"/>
-            <a:ext cx="3343140" cy="1446550"/>
+            <a:off x="6627339" y="4617493"/>
+            <a:ext cx="4059213" cy="1037207"/>
           </a:xfrm>
           <a:prstGeom prst="rect">
             <a:avLst/>
@@ -9148,8 +9097,31 @@
                   <a:schemeClr val="bg1"/>
                 </a:solidFill>
               </a:rPr>
-              <a:t>Twitter:</a:t>
-            </a:r>
+              <a:t>Twitter: </a:t>
+            </a:r>
+            <a:r>
+              <a:rPr lang="en-CA" sz="2400" dirty="0">
+                <a:solidFill>
+                  <a:schemeClr val="bg1"/>
+                </a:solidFill>
+                <a:hlinkClick r:id="rId5"/>
+              </a:rPr>
+              <a:t>@</a:t>
+            </a:r>
+            <a:r>
+              <a:rPr lang="en-CA" sz="2400" dirty="0" err="1">
+                <a:solidFill>
+                  <a:schemeClr val="bg1"/>
+                </a:solidFill>
+                <a:hlinkClick r:id="rId5"/>
+              </a:rPr>
+              <a:t>avezina</a:t>
+            </a:r>
+            <a:endParaRPr lang="en-CA" sz="2400" dirty="0">
+              <a:solidFill>
+                <a:schemeClr val="bg1"/>
+              </a:solidFill>
+            </a:endParaRPr>
           </a:p>
           <a:p>
             <a:pPr>
@@ -9168,25 +9140,19 @@
               </a:rPr>
               <a:t>Blog: </a:t>
             </a:r>
-          </a:p>
-          <a:p>
-            <a:pPr>
-              <a:lnSpc>
-                <a:spcPct val="90000"/>
-              </a:lnSpc>
-              <a:spcAft>
-                <a:spcPts val="600"/>
-              </a:spcAft>
-            </a:pPr>
             <a:r>
               <a:rPr lang="en-CA" sz="2400" dirty="0">
-                <a:solidFill>
-                  <a:schemeClr val="bg1"/>
-                </a:solidFill>
+                <a:hlinkClick r:id="rId6"/>
               </a:rPr>
-              <a:t>Other:</a:t>
-            </a:r>
-            <a:endParaRPr lang="en-US" sz="2400" dirty="0" err="1">
+              <a:t>h</a:t>
+            </a:r>
+            <a:r>
+              <a:rPr lang="en-CA" sz="2400" dirty="0">
+                <a:hlinkClick r:id="rId6"/>
+              </a:rPr>
+              <a:t>ttp://alain.cloud</a:t>
+            </a:r>
+            <a:endParaRPr lang="en-CA" sz="2400" dirty="0">
               <a:solidFill>
                 <a:schemeClr val="bg1"/>
               </a:solidFill>

</xml_diff>

<commit_message>
add Halifax & fix slides
</commit_message>
<xml_diff>
--- a/Locations/Montreal/Welcome.pptx
+++ b/Locations/Montreal/Welcome.pptx
@@ -228,7 +228,7 @@
           <a:p>
             <a:fld id="{9EB326D8-4C38-4835-91AB-B79CDC0B07B3}" type="datetimeFigureOut">
               <a:rPr lang="en-US" smtClean="0"/>
-              <a:t>4/1/2019</a:t>
+              <a:t>2019-04-09</a:t>
             </a:fld>
             <a:endParaRPr lang="en-US"/>
           </a:p>
@@ -5626,7 +5626,7 @@
           <a:p>
             <a:fld id="{021C408F-DF0D-4580-9F48-C473147CA8AF}" type="datetimeFigureOut">
               <a:rPr lang="en-US" smtClean="0"/>
-              <a:t>4/1/2019</a:t>
+              <a:t>2019-04-09</a:t>
             </a:fld>
             <a:endParaRPr lang="en-US"/>
           </a:p>
@@ -7064,7 +7064,7 @@
           <p:nvPr>
             <p:extLst>
               <p:ext uri="{D42A27DB-BD31-4B8C-83A1-F6EECF244321}">
-                <p14:modId xmlns:p14="http://schemas.microsoft.com/office/powerpoint/2010/main" val="789421184"/>
+                <p14:modId xmlns:p14="http://schemas.microsoft.com/office/powerpoint/2010/main" val="1884576980"/>
               </p:ext>
             </p:extLst>
           </p:nvPr>
@@ -7482,7 +7482,7 @@
                             <a:schemeClr val="bg1"/>
                           </a:solidFill>
                         </a:rPr>
-                        <a:t>Lab 3 - Testing</a:t>
+                        <a:t>Lab 3 – Container 1</a:t>
                       </a:r>
                     </a:p>
                   </a:txBody>
@@ -7551,7 +7551,7 @@
                             <a:schemeClr val="bg1"/>
                           </a:solidFill>
                         </a:rPr>
-                        <a:t>Lab 4 - Containers</a:t>
+                        <a:t>Lab 4 – Container 2</a:t>
                       </a:r>
                     </a:p>
                   </a:txBody>
@@ -7758,7 +7758,7 @@
                             <a:schemeClr val="bg1"/>
                           </a:solidFill>
                         </a:rPr>
-                        <a:t>Lab 6 - ???</a:t>
+                        <a:t>Lab 6 - Serverless</a:t>
                       </a:r>
                     </a:p>
                   </a:txBody>
@@ -7827,7 +7827,7 @@
                             <a:schemeClr val="bg1"/>
                           </a:solidFill>
                         </a:rPr>
-                        <a:t>Lab 7 - ???</a:t>
+                        <a:t>Lab 7 - Security</a:t>
                       </a:r>
                     </a:p>
                   </a:txBody>
@@ -9144,13 +9144,7 @@
               <a:rPr lang="en-CA" sz="2400" dirty="0">
                 <a:hlinkClick r:id="rId6"/>
               </a:rPr>
-              <a:t>h</a:t>
-            </a:r>
-            <a:r>
-              <a:rPr lang="en-CA" sz="2400" dirty="0">
-                <a:hlinkClick r:id="rId6"/>
-              </a:rPr>
-              <a:t>ttp://alain.cloud</a:t>
+              <a:t>http://alain.cloud</a:t>
             </a:r>
             <a:endParaRPr lang="en-CA" sz="2400" dirty="0">
               <a:solidFill>

</xml_diff>

<commit_message>
Update to the slides
</commit_message>
<xml_diff>
--- a/Locations/Montreal/Welcome.pptx
+++ b/Locations/Montreal/Welcome.pptx
@@ -228,7 +228,7 @@
           <a:p>
             <a:fld id="{9EB326D8-4C38-4835-91AB-B79CDC0B07B3}" type="datetimeFigureOut">
               <a:rPr lang="en-US" smtClean="0"/>
-              <a:t>2019-04-09</a:t>
+              <a:t>4/14/2019</a:t>
             </a:fld>
             <a:endParaRPr lang="en-US"/>
           </a:p>
@@ -5626,7 +5626,7 @@
           <a:p>
             <a:fld id="{021C408F-DF0D-4580-9F48-C473147CA8AF}" type="datetimeFigureOut">
               <a:rPr lang="en-US" smtClean="0"/>
-              <a:t>2019-04-09</a:t>
+              <a:t>4/14/2019</a:t>
             </a:fld>
             <a:endParaRPr lang="en-US"/>
           </a:p>
@@ -7064,7 +7064,7 @@
           <p:nvPr>
             <p:extLst>
               <p:ext uri="{D42A27DB-BD31-4B8C-83A1-F6EECF244321}">
-                <p14:modId xmlns:p14="http://schemas.microsoft.com/office/powerpoint/2010/main" val="1884576980"/>
+                <p14:modId xmlns:p14="http://schemas.microsoft.com/office/powerpoint/2010/main" val="1817903349"/>
               </p:ext>
             </p:extLst>
           </p:nvPr>
@@ -7344,7 +7344,7 @@
                             <a:schemeClr val="bg1"/>
                           </a:solidFill>
                         </a:rPr>
-                        <a:t>Lab 1 - CI/CD</a:t>
+                        <a:t>CI/CD</a:t>
                       </a:r>
                     </a:p>
                   </a:txBody>
@@ -7413,7 +7413,7 @@
                             <a:schemeClr val="bg1"/>
                           </a:solidFill>
                         </a:rPr>
-                        <a:t>Lab 2 - ARM template</a:t>
+                        <a:t>ARM template</a:t>
                       </a:r>
                     </a:p>
                   </a:txBody>
@@ -7477,12 +7477,20 @@
                     <a:p>
                       <a:pPr algn="l"/>
                       <a:r>
+                        <a:rPr lang="en-US" sz="2800">
+                          <a:solidFill>
+                            <a:schemeClr val="bg1"/>
+                          </a:solidFill>
+                        </a:rPr>
+                        <a:t>Container Part </a:t>
+                      </a:r>
+                      <a:r>
                         <a:rPr lang="en-US" sz="2800" dirty="0">
                           <a:solidFill>
                             <a:schemeClr val="bg1"/>
                           </a:solidFill>
                         </a:rPr>
-                        <a:t>Lab 3 – Container 1</a:t>
+                        <a:t>1</a:t>
                       </a:r>
                     </a:p>
                   </a:txBody>
@@ -7551,7 +7559,7 @@
                             <a:schemeClr val="bg1"/>
                           </a:solidFill>
                         </a:rPr>
-                        <a:t>Lab 4 – Container 2</a:t>
+                        <a:t>Container Part Deux</a:t>
                       </a:r>
                     </a:p>
                   </a:txBody>
@@ -7689,7 +7697,7 @@
                             <a:schemeClr val="bg1"/>
                           </a:solidFill>
                         </a:rPr>
-                        <a:t>Lab 5 - AI</a:t>
+                        <a:t>AI</a:t>
                       </a:r>
                     </a:p>
                   </a:txBody>
@@ -7758,7 +7766,7 @@
                             <a:schemeClr val="bg1"/>
                           </a:solidFill>
                         </a:rPr>
-                        <a:t>Lab 6 - Serverless</a:t>
+                        <a:t>Serverless</a:t>
                       </a:r>
                     </a:p>
                   </a:txBody>
@@ -7827,7 +7835,7 @@
                             <a:schemeClr val="bg1"/>
                           </a:solidFill>
                         </a:rPr>
-                        <a:t>Lab 7 - Security</a:t>
+                        <a:t>Security</a:t>
                       </a:r>
                     </a:p>
                   </a:txBody>
@@ -7891,18 +7899,13 @@
                     <a:p>
                       <a:pPr algn="l"/>
                       <a:r>
-                        <a:rPr lang="en-US" sz="2800" dirty="0" err="1">
+                        <a:rPr lang="en-US" sz="2800" dirty="0">
                           <a:solidFill>
                             <a:schemeClr val="bg1"/>
                           </a:solidFill>
                         </a:rPr>
-                        <a:t>Endind</a:t>
+                        <a:t>Ending</a:t>
                       </a:r>
-                      <a:endParaRPr lang="en-US" sz="2800" dirty="0">
-                        <a:solidFill>
-                          <a:schemeClr val="bg1"/>
-                        </a:solidFill>
-                      </a:endParaRPr>
                     </a:p>
                   </a:txBody>
                   <a:tcPr marL="50959" marR="50959" marT="25479" marB="25479" anchor="ctr">
@@ -8428,7 +8431,7 @@
         </p:nvSpPr>
         <p:spPr>
           <a:xfrm>
-            <a:off x="864973" y="3980208"/>
+            <a:off x="282975" y="3981778"/>
             <a:ext cx="3546389" cy="627864"/>
           </a:xfrm>
           <a:prstGeom prst="rect">
@@ -8488,7 +8491,7 @@
         </p:nvSpPr>
         <p:spPr>
           <a:xfrm>
-            <a:off x="864972" y="4617493"/>
+            <a:off x="282974" y="4619063"/>
             <a:ext cx="3694327" cy="1037207"/>
           </a:xfrm>
           <a:prstGeom prst="rect">
@@ -8567,7 +8570,7 @@
         </p:blipFill>
         <p:spPr>
           <a:xfrm>
-            <a:off x="6899968" y="1517232"/>
+            <a:off x="4630113" y="1558742"/>
             <a:ext cx="2462976" cy="2462976"/>
           </a:xfrm>
           <a:prstGeom prst="rect">
@@ -8589,7 +8592,7 @@
         </p:nvSpPr>
         <p:spPr>
           <a:xfrm>
-            <a:off x="6627340" y="3980208"/>
+            <a:off x="4421052" y="4021718"/>
             <a:ext cx="3546389" cy="627864"/>
           </a:xfrm>
           <a:prstGeom prst="rect">
@@ -8641,7 +8644,7 @@
         </p:nvSpPr>
         <p:spPr>
           <a:xfrm>
-            <a:off x="6627339" y="4617493"/>
+            <a:off x="4421051" y="4659003"/>
             <a:ext cx="4160525" cy="1037207"/>
           </a:xfrm>
           <a:prstGeom prst="rect">
@@ -8733,8 +8736,161 @@
         </p:blipFill>
         <p:spPr>
           <a:xfrm>
-            <a:off x="745768" y="1558742"/>
+            <a:off x="490423" y="1565070"/>
             <a:ext cx="3546389" cy="2362983"/>
+          </a:xfrm>
+          <a:prstGeom prst="rect">
+            <a:avLst/>
+          </a:prstGeom>
+        </p:spPr>
+      </p:pic>
+      <p:sp>
+        <p:nvSpPr>
+          <p:cNvPr id="9" name="TextBox 8">
+            <a:extLst>
+              <a:ext uri="{FF2B5EF4-FFF2-40B4-BE49-F238E27FC236}">
+                <a16:creationId xmlns:a16="http://schemas.microsoft.com/office/drawing/2014/main" id="{CD2EB69E-F336-4BD1-B8B9-CA306A2E76A5}"/>
+              </a:ext>
+            </a:extLst>
+          </p:cNvPr>
+          <p:cNvSpPr txBox="1"/>
+          <p:nvPr/>
+        </p:nvSpPr>
+        <p:spPr>
+          <a:xfrm>
+            <a:off x="8239441" y="4031139"/>
+            <a:ext cx="3546389" cy="627864"/>
+          </a:xfrm>
+          <a:prstGeom prst="rect">
+            <a:avLst/>
+          </a:prstGeom>
+          <a:noFill/>
+        </p:spPr>
+        <p:txBody>
+          <a:bodyPr wrap="square" lIns="182880" tIns="146304" rIns="182880" bIns="146304" rtlCol="0">
+            <a:spAutoFit/>
+          </a:bodyPr>
+          <a:lstStyle/>
+          <a:p>
+            <a:pPr>
+              <a:lnSpc>
+                <a:spcPct val="90000"/>
+              </a:lnSpc>
+              <a:spcAft>
+                <a:spcPts val="600"/>
+              </a:spcAft>
+            </a:pPr>
+            <a:r>
+              <a:rPr lang="en-CA" sz="2400" b="1" dirty="0">
+                <a:solidFill>
+                  <a:schemeClr val="bg1"/>
+                </a:solidFill>
+              </a:rPr>
+              <a:t>Guy Barrette</a:t>
+            </a:r>
+            <a:endParaRPr lang="en-US" sz="2400" b="1" dirty="0" err="1">
+              <a:solidFill>
+                <a:schemeClr val="bg1"/>
+              </a:solidFill>
+            </a:endParaRPr>
+          </a:p>
+        </p:txBody>
+      </p:sp>
+      <p:sp>
+        <p:nvSpPr>
+          <p:cNvPr id="10" name="TextBox 9">
+            <a:extLst>
+              <a:ext uri="{FF2B5EF4-FFF2-40B4-BE49-F238E27FC236}">
+                <a16:creationId xmlns:a16="http://schemas.microsoft.com/office/drawing/2014/main" id="{04FE58EF-99A6-442A-83CD-858019D7B22B}"/>
+              </a:ext>
+            </a:extLst>
+          </p:cNvPr>
+          <p:cNvSpPr txBox="1"/>
+          <p:nvPr/>
+        </p:nvSpPr>
+        <p:spPr>
+          <a:xfrm>
+            <a:off x="8239440" y="4668424"/>
+            <a:ext cx="4160525" cy="1037207"/>
+          </a:xfrm>
+          <a:prstGeom prst="rect">
+            <a:avLst/>
+          </a:prstGeom>
+          <a:noFill/>
+        </p:spPr>
+        <p:txBody>
+          <a:bodyPr wrap="square" lIns="182880" tIns="146304" rIns="182880" bIns="146304" rtlCol="0">
+            <a:spAutoFit/>
+          </a:bodyPr>
+          <a:lstStyle/>
+          <a:p>
+            <a:pPr>
+              <a:lnSpc>
+                <a:spcPct val="90000"/>
+              </a:lnSpc>
+              <a:spcAft>
+                <a:spcPts val="600"/>
+              </a:spcAft>
+            </a:pPr>
+            <a:r>
+              <a:rPr lang="en-CA" sz="2400" dirty="0">
+                <a:solidFill>
+                  <a:schemeClr val="bg1"/>
+                </a:solidFill>
+              </a:rPr>
+              <a:t>Twitter: @guybarrette</a:t>
+            </a:r>
+          </a:p>
+          <a:p>
+            <a:pPr>
+              <a:lnSpc>
+                <a:spcPct val="90000"/>
+              </a:lnSpc>
+              <a:spcAft>
+                <a:spcPts val="600"/>
+              </a:spcAft>
+            </a:pPr>
+            <a:r>
+              <a:rPr lang="en-CA" sz="2400" dirty="0">
+                <a:solidFill>
+                  <a:schemeClr val="bg1"/>
+                </a:solidFill>
+              </a:rPr>
+              <a:t>Blog: blog.guybarrette.com</a:t>
+            </a:r>
+          </a:p>
+        </p:txBody>
+      </p:sp>
+      <p:pic>
+        <p:nvPicPr>
+          <p:cNvPr id="5" name="Picture 4">
+            <a:extLst>
+              <a:ext uri="{FF2B5EF4-FFF2-40B4-BE49-F238E27FC236}">
+                <a16:creationId xmlns:a16="http://schemas.microsoft.com/office/drawing/2014/main" id="{9AEE9B46-D989-4388-BED9-97DB2A4210E2}"/>
+              </a:ext>
+            </a:extLst>
+          </p:cNvPr>
+          <p:cNvPicPr>
+            <a:picLocks noChangeAspect="1"/>
+          </p:cNvPicPr>
+          <p:nvPr/>
+        </p:nvPicPr>
+        <p:blipFill>
+          <a:blip r:embed="rId4" cstate="print">
+            <a:extLst>
+              <a:ext uri="{28A0092B-C50C-407E-A947-70E740481C1C}">
+                <a14:useLocalDpi xmlns:a14="http://schemas.microsoft.com/office/drawing/2010/main" val="0"/>
+              </a:ext>
+            </a:extLst>
+          </a:blip>
+          <a:stretch>
+            <a:fillRect/>
+          </a:stretch>
+        </p:blipFill>
+        <p:spPr>
+          <a:xfrm>
+            <a:off x="8386247" y="1539294"/>
+            <a:ext cx="2119992" cy="2472397"/>
           </a:xfrm>
           <a:prstGeom prst="rect">
             <a:avLst/>
@@ -8919,19 +9075,8 @@
                   <a:schemeClr val="bg1"/>
                 </a:solidFill>
               </a:rPr>
-              <a:t>Twitter: </a:t>
+              <a:t>Twitter: @MiguelBernard88</a:t>
             </a:r>
-            <a:r>
-              <a:rPr lang="en-CA" dirty="0">
-                <a:hlinkClick r:id="rId2"/>
-              </a:rPr>
-              <a:t>@MiguelBernard88</a:t>
-            </a:r>
-            <a:endParaRPr lang="en-CA" sz="2400" dirty="0">
-              <a:solidFill>
-                <a:schemeClr val="bg1"/>
-              </a:solidFill>
-            </a:endParaRPr>
           </a:p>
           <a:p>
             <a:pPr>
@@ -8948,22 +9093,8 @@
                   <a:schemeClr val="bg1"/>
                 </a:solidFill>
               </a:rPr>
-              <a:t>Blog: </a:t>
+              <a:t>Blog: https://blog.miguelbernard.com</a:t>
             </a:r>
-            <a:r>
-              <a:rPr lang="en-CA" sz="2400" dirty="0">
-                <a:solidFill>
-                  <a:schemeClr val="bg1"/>
-                </a:solidFill>
-                <a:hlinkClick r:id="rId3"/>
-              </a:rPr>
-              <a:t>https://blog.miguelbernard.com</a:t>
-            </a:r>
-            <a:endParaRPr lang="en-CA" sz="2400" dirty="0">
-              <a:solidFill>
-                <a:schemeClr val="bg1"/>
-              </a:solidFill>
-            </a:endParaRPr>
           </a:p>
         </p:txBody>
       </p:sp>
@@ -8982,7 +9113,7 @@
           <p:nvPr/>
         </p:nvPicPr>
         <p:blipFill>
-          <a:blip r:embed="rId4" cstate="print">
+          <a:blip r:embed="rId2" cstate="print">
             <a:extLst>
               <a:ext uri="{28A0092B-C50C-407E-A947-70E740481C1C}">
                 <a14:useLocalDpi xmlns:a14="http://schemas.microsoft.com/office/drawing/2010/main" val="0"/>
@@ -9097,23 +9228,13 @@
                   <a:schemeClr val="bg1"/>
                 </a:solidFill>
               </a:rPr>
-              <a:t>Twitter: </a:t>
-            </a:r>
-            <a:r>
-              <a:rPr lang="en-CA" sz="2400" dirty="0">
-                <a:solidFill>
-                  <a:schemeClr val="bg1"/>
-                </a:solidFill>
-                <a:hlinkClick r:id="rId5"/>
-              </a:rPr>
-              <a:t>@</a:t>
+              <a:t>Twitter: @</a:t>
             </a:r>
             <a:r>
               <a:rPr lang="en-CA" sz="2400" dirty="0" err="1">
                 <a:solidFill>
                   <a:schemeClr val="bg1"/>
                 </a:solidFill>
-                <a:hlinkClick r:id="rId5"/>
               </a:rPr>
               <a:t>avezina</a:t>
             </a:r>
@@ -9138,19 +9259,8 @@
                   <a:schemeClr val="bg1"/>
                 </a:solidFill>
               </a:rPr>
-              <a:t>Blog: </a:t>
+              <a:t>Blog: http://alain.cloud</a:t>
             </a:r>
-            <a:r>
-              <a:rPr lang="en-CA" sz="2400" dirty="0">
-                <a:hlinkClick r:id="rId6"/>
-              </a:rPr>
-              <a:t>http://alain.cloud</a:t>
-            </a:r>
-            <a:endParaRPr lang="en-CA" sz="2400" dirty="0">
-              <a:solidFill>
-                <a:schemeClr val="bg1"/>
-              </a:solidFill>
-            </a:endParaRPr>
           </a:p>
         </p:txBody>
       </p:sp>
@@ -9169,7 +9279,7 @@
           <p:nvPr/>
         </p:nvPicPr>
         <p:blipFill>
-          <a:blip r:embed="rId7">
+          <a:blip r:embed="rId3">
             <a:extLst>
               <a:ext uri="{28A0092B-C50C-407E-A947-70E740481C1C}">
                 <a14:useLocalDpi xmlns:a14="http://schemas.microsoft.com/office/drawing/2010/main" val="0"/>

</xml_diff>

<commit_message>
fixed little issues with code / navigation formatting
</commit_message>
<xml_diff>
--- a/Locations/Montreal/Welcome.pptx
+++ b/Locations/Montreal/Welcome.pptx
@@ -228,7 +228,7 @@
           <a:p>
             <a:fld id="{9EB326D8-4C38-4835-91AB-B79CDC0B07B3}" type="datetimeFigureOut">
               <a:rPr lang="en-US" smtClean="0"/>
-              <a:t>4/14/2019</a:t>
+              <a:t>4/24/2019</a:t>
             </a:fld>
             <a:endParaRPr lang="en-US"/>
           </a:p>
@@ -5626,7 +5626,7 @@
           <a:p>
             <a:fld id="{021C408F-DF0D-4580-9F48-C473147CA8AF}" type="datetimeFigureOut">
               <a:rPr lang="en-US" smtClean="0"/>
-              <a:t>4/14/2019</a:t>
+              <a:t>4/24/2019</a:t>
             </a:fld>
             <a:endParaRPr lang="en-US"/>
           </a:p>
@@ -7064,7 +7064,7 @@
           <p:nvPr>
             <p:extLst>
               <p:ext uri="{D42A27DB-BD31-4B8C-83A1-F6EECF244321}">
-                <p14:modId xmlns:p14="http://schemas.microsoft.com/office/powerpoint/2010/main" val="1817903349"/>
+                <p14:modId xmlns:p14="http://schemas.microsoft.com/office/powerpoint/2010/main" val="50313824"/>
               </p:ext>
             </p:extLst>
           </p:nvPr>
@@ -7170,12 +7170,12 @@
                     <a:p>
                       <a:pPr algn="ctr"/>
                       <a:r>
-                        <a:rPr lang="en-US" sz="2800">
+                        <a:rPr lang="en-US" sz="2800" dirty="0">
                           <a:solidFill>
                             <a:schemeClr val="bg1"/>
                           </a:solidFill>
                         </a:rPr>
-                        <a:t>08h30-9h00</a:t>
+                        <a:t>08h30-09h00</a:t>
                       </a:r>
                     </a:p>
                   </a:txBody>
@@ -7239,12 +7239,12 @@
                     <a:p>
                       <a:pPr algn="ctr"/>
                       <a:r>
-                        <a:rPr lang="en-US" sz="2800">
+                        <a:rPr lang="en-US" sz="2800" dirty="0">
                           <a:solidFill>
                             <a:schemeClr val="bg1"/>
                           </a:solidFill>
                         </a:rPr>
-                        <a:t>09h00-9h15</a:t>
+                        <a:t>09h00-09h15</a:t>
                       </a:r>
                     </a:p>
                   </a:txBody>
@@ -7661,7 +7661,7 @@
                     <a:p>
                       <a:pPr algn="ctr"/>
                       <a:r>
-                        <a:rPr lang="en-US" sz="2800">
+                        <a:rPr lang="en-US" sz="2800" dirty="0">
                           <a:solidFill>
                             <a:schemeClr val="bg1"/>
                           </a:solidFill>
@@ -7799,7 +7799,7 @@
                     <a:p>
                       <a:pPr algn="ctr"/>
                       <a:r>
-                        <a:rPr lang="en-US" sz="2800">
+                        <a:rPr lang="en-US" sz="2800" dirty="0">
                           <a:solidFill>
                             <a:schemeClr val="bg1"/>
                           </a:solidFill>
@@ -7868,12 +7868,12 @@
                     <a:p>
                       <a:pPr algn="ctr"/>
                       <a:r>
-                        <a:rPr lang="en-US" sz="2800">
+                        <a:rPr lang="en-US" sz="2800" dirty="0">
                           <a:solidFill>
                             <a:schemeClr val="bg1"/>
                           </a:solidFill>
                         </a:rPr>
-                        <a:t>15h15-12h30</a:t>
+                        <a:t>15h15-16h30</a:t>
                       </a:r>
                     </a:p>
                   </a:txBody>

</xml_diff>